<commit_message>
Slide edit - long term targets
</commit_message>
<xml_diff>
--- a/MF.pptx
+++ b/MF.pptx
@@ -6,13 +6,12 @@
     <p:sldMasterId id="2147483660" r:id="rId2"/>
   </p:sldMasterIdLst>
   <p:notesMasterIdLst>
-    <p:notesMasterId r:id="rId7"/>
+    <p:notesMasterId r:id="rId6"/>
   </p:notesMasterIdLst>
   <p:sldIdLst>
     <p:sldId id="256" r:id="rId3"/>
     <p:sldId id="257" r:id="rId4"/>
-    <p:sldId id="259" r:id="rId5"/>
-    <p:sldId id="260" r:id="rId6"/>
+    <p:sldId id="260" r:id="rId5"/>
   </p:sldIdLst>
   <p:sldSz cx="12192000" cy="6858000"/>
   <p:notesSz cx="6858000" cy="9144000"/>
@@ -111,6 +110,11 @@
       </a:defRPr>
     </a:lvl9pPr>
   </p:defaultTextStyle>
+  <p:extLst>
+    <p:ext uri="{EFAFB233-063F-42B5-8137-9DF3F51BA10A}">
+      <p15:sldGuideLst xmlns:p15="http://schemas.microsoft.com/office/powerpoint/2012/main"/>
+    </p:ext>
+  </p:extLst>
 </p:presentation>
 </file>
 
@@ -618,7 +622,7 @@
                 </a:solidFill>
               </a:rPr>
               <a:pPr/>
-              <a:t>4</a:t>
+              <a:t>3</a:t>
             </a:fld>
             <a:endParaRPr lang="en-US">
               <a:solidFill>
@@ -770,7 +774,7 @@
           <a:bodyPr/>
           <a:lstStyle/>
           <a:p>
-            <a:fld id="{03E7FE75-1ADD-4121-BA7F-4EABF8EDC1C0}" type="datetime1">
+            <a:fld id="{B87F20D4-FAAC-4709-A015-63F66A84977B}" type="datetime1">
               <a:rPr lang="en-US" smtClean="0"/>
               <a:t>15-Jul-18</a:t>
             </a:fld>
@@ -944,7 +948,7 @@
           <a:bodyPr/>
           <a:lstStyle/>
           <a:p>
-            <a:fld id="{39355FD6-65E0-4017-9B1D-0720172DFC5D}" type="datetime1">
+            <a:fld id="{2802B2B7-ED80-4526-813A-639DC014C3AE}" type="datetime1">
               <a:rPr lang="en-US" smtClean="0"/>
               <a:t>15-Jul-18</a:t>
             </a:fld>
@@ -1128,7 +1132,7 @@
           <a:bodyPr/>
           <a:lstStyle/>
           <a:p>
-            <a:fld id="{E4CF4994-6EA1-4C81-8592-441BC3FF9A1D}" type="datetime1">
+            <a:fld id="{8ED75451-B997-477F-8CAA-538809B53D3F}" type="datetime1">
               <a:rPr lang="en-US" smtClean="0"/>
               <a:t>15-Jul-18</a:t>
             </a:fld>
@@ -2863,7 +2867,7 @@
           <a:bodyPr/>
           <a:lstStyle/>
           <a:p>
-            <a:fld id="{F4CA11F1-FEC8-45AC-AEA6-CC921F80210D}" type="datetime1">
+            <a:fld id="{061776AB-E7DD-4905-AEE0-E3206F53B75C}" type="datetime1">
               <a:rPr lang="en-US" smtClean="0"/>
               <a:t>15-Jul-18</a:t>
             </a:fld>
@@ -3608,7 +3612,7 @@
           <a:bodyPr/>
           <a:lstStyle/>
           <a:p>
-            <a:fld id="{050EB910-C444-4671-AA2B-CA4472D221E8}" type="datetime1">
+            <a:fld id="{927A83D6-E015-4091-A4CF-001BC9D24B99}" type="datetime1">
               <a:rPr lang="en-US" smtClean="0"/>
               <a:t>15-Jul-18</a:t>
             </a:fld>
@@ -3844,7 +3848,7 @@
           <a:bodyPr/>
           <a:lstStyle/>
           <a:p>
-            <a:fld id="{E9EF8C58-8A45-4DB1-8A4F-3063FE2A2001}" type="datetime1">
+            <a:fld id="{C5A55A17-8B06-4AED-8B70-77330A2C0058}" type="datetime1">
               <a:rPr lang="en-US" smtClean="0"/>
               <a:t>15-Jul-18</a:t>
             </a:fld>
@@ -4215,7 +4219,7 @@
           <a:bodyPr/>
           <a:lstStyle/>
           <a:p>
-            <a:fld id="{179A14FF-2699-4912-B351-757DE550C53F}" type="datetime1">
+            <a:fld id="{53A88D7E-DFF1-4AB7-8E83-87FA524EE722}" type="datetime1">
               <a:rPr lang="en-US" smtClean="0"/>
               <a:t>15-Jul-18</a:t>
             </a:fld>
@@ -4337,7 +4341,7 @@
           <a:bodyPr/>
           <a:lstStyle/>
           <a:p>
-            <a:fld id="{FD2A19E5-BD01-4641-A66B-4D20518E6D06}" type="datetime1">
+            <a:fld id="{EB68E279-0AAF-4228-B7E3-E7F53E755973}" type="datetime1">
               <a:rPr lang="en-US" smtClean="0"/>
               <a:t>15-Jul-18</a:t>
             </a:fld>
@@ -4436,7 +4440,7 @@
           <a:bodyPr/>
           <a:lstStyle/>
           <a:p>
-            <a:fld id="{25D301B6-873F-4C0E-8C29-FA97100F8E17}" type="datetime1">
+            <a:fld id="{4B5523CC-C5F4-40E1-A6D0-79250424172E}" type="datetime1">
               <a:rPr lang="en-US" smtClean="0"/>
               <a:t>15-Jul-18</a:t>
             </a:fld>
@@ -4717,7 +4721,7 @@
           <a:bodyPr/>
           <a:lstStyle/>
           <a:p>
-            <a:fld id="{01EF2CC5-9A1B-4579-A635-647EC85D03BE}" type="datetime1">
+            <a:fld id="{A6680C4C-AEF2-4E72-A141-62D7E8CE3F69}" type="datetime1">
               <a:rPr lang="en-US" smtClean="0"/>
               <a:t>15-Jul-18</a:t>
             </a:fld>
@@ -4974,7 +4978,7 @@
           <a:bodyPr/>
           <a:lstStyle/>
           <a:p>
-            <a:fld id="{67AF3227-A2D4-45C5-B8C8-F32C07BF24B9}" type="datetime1">
+            <a:fld id="{F6083380-2BEB-4D5F-9FF1-398F188BFC3F}" type="datetime1">
               <a:rPr lang="en-US" smtClean="0"/>
               <a:t>15-Jul-18</a:t>
             </a:fld>
@@ -5197,7 +5201,7 @@
             </a:lvl1pPr>
           </a:lstStyle>
           <a:p>
-            <a:fld id="{24904993-805A-4E2C-BBA6-7F37DB1F2100}" type="datetime1">
+            <a:fld id="{2E29E2F8-A823-42B3-88E7-0942DB5E7E12}" type="datetime1">
               <a:rPr lang="en-US" smtClean="0"/>
               <a:t>15-Jul-18</a:t>
             </a:fld>
@@ -5644,14 +5648,14 @@
           </a:ln>
           <a:extLst>
             <a:ext uri="{909E8E84-426E-40dd-AFC4-6F175D3DCCD1}">
-              <a14:hiddenFill xmlns="" xmlns:a14="http://schemas.microsoft.com/office/drawing/2010/main">
+              <a14:hiddenFill xmlns:a14="http://schemas.microsoft.com/office/drawing/2010/main" xmlns="">
                 <a:solidFill>
                   <a:srgbClr val="FFFFFF"/>
                 </a:solidFill>
               </a14:hiddenFill>
             </a:ext>
             <a:ext uri="{91240B29-F687-4f45-9708-019B960494DF}">
-              <a14:hiddenLine xmlns="" xmlns:a14="http://schemas.microsoft.com/office/drawing/2010/main" w="9525">
+              <a14:hiddenLine xmlns:a14="http://schemas.microsoft.com/office/drawing/2010/main" xmlns="" w="9525">
                 <a:solidFill>
                   <a:srgbClr val="000000"/>
                 </a:solidFill>
@@ -5661,7 +5665,7 @@
               </a14:hiddenLine>
             </a:ext>
             <a:ext uri="{FAA26D3D-D897-4be2-8F04-BA451C77F1D7}">
-              <ma14:placeholderFlag xmlns="" xmlns:ma14="http://schemas.microsoft.com/office/mac/drawingml/2011/main" val="1"/>
+              <ma14:placeholderFlag xmlns:ma14="http://schemas.microsoft.com/office/mac/drawingml/2011/main" xmlns="" val="1"/>
             </a:ext>
           </a:extLst>
         </p:spPr>
@@ -5705,14 +5709,14 @@
           </a:ln>
           <a:extLst>
             <a:ext uri="{909E8E84-426E-40dd-AFC4-6F175D3DCCD1}">
-              <a14:hiddenFill xmlns="" xmlns:a14="http://schemas.microsoft.com/office/drawing/2010/main">
+              <a14:hiddenFill xmlns:a14="http://schemas.microsoft.com/office/drawing/2010/main" xmlns="">
                 <a:solidFill>
                   <a:srgbClr val="FFFFFF"/>
                 </a:solidFill>
               </a14:hiddenFill>
             </a:ext>
             <a:ext uri="{91240B29-F687-4f45-9708-019B960494DF}">
-              <a14:hiddenLine xmlns="" xmlns:a14="http://schemas.microsoft.com/office/drawing/2010/main" w="9525">
+              <a14:hiddenLine xmlns:a14="http://schemas.microsoft.com/office/drawing/2010/main" xmlns="" w="9525">
                 <a:solidFill>
                   <a:srgbClr val="000000"/>
                 </a:solidFill>
@@ -5722,7 +5726,7 @@
               </a14:hiddenLine>
             </a:ext>
             <a:ext uri="{FAA26D3D-D897-4be2-8F04-BA451C77F1D7}">
-              <ma14:placeholderFlag xmlns="" xmlns:ma14="http://schemas.microsoft.com/office/mac/drawingml/2011/main" val="1"/>
+              <ma14:placeholderFlag xmlns:ma14="http://schemas.microsoft.com/office/mac/drawingml/2011/main" xmlns="" val="1"/>
             </a:ext>
           </a:extLst>
         </p:spPr>
@@ -5857,7 +5861,7 @@
     <p:sldLayoutId id="2147483670" r:id="rId10"/>
     <p:sldLayoutId id="2147483671" r:id="rId11"/>
   </p:sldLayoutIdLst>
-  <p:hf hdr="0" ftr="0" dt="0"/>
+  <p:hf hdr="0" dt="0"/>
   <p:txStyles>
     <p:titleStyle>
       <a:lvl1pPr algn="ctr" defTabSz="457200" rtl="0" eaLnBrk="0" fontAlgn="base" hangingPunct="0">
@@ -6372,35 +6376,6 @@
       </p:grpSpPr>
       <p:sp>
         <p:nvSpPr>
-          <p:cNvPr id="2" name="Title 1"/>
-          <p:cNvSpPr>
-            <a:spLocks noGrp="1"/>
-          </p:cNvSpPr>
-          <p:nvPr>
-            <p:ph type="title"/>
-          </p:nvPr>
-        </p:nvSpPr>
-        <p:spPr>
-          <a:xfrm>
-            <a:off x="0" y="1"/>
-            <a:ext cx="12192000" cy="720435"/>
-          </a:xfrm>
-        </p:spPr>
-        <p:txBody>
-          <a:bodyPr/>
-          <a:lstStyle/>
-          <a:p>
-            <a:pPr algn="ctr"/>
-            <a:r>
-              <a:rPr lang="en-US" dirty="0" smtClean="0"/>
-              <a:t>MF: Summary</a:t>
-            </a:r>
-            <a:endParaRPr lang="en-US" dirty="0"/>
-          </a:p>
-        </p:txBody>
-      </p:sp>
-      <p:sp>
-        <p:nvSpPr>
           <p:cNvPr id="3" name="Content Placeholder 2"/>
           <p:cNvSpPr>
             <a:spLocks noGrp="1"/>
@@ -6422,10 +6397,6 @@
             <a:pPr marL="0" indent="0">
               <a:buNone/>
             </a:pPr>
-            <a:r>
-              <a:rPr lang="en-US" dirty="0" smtClean="0"/>
-              <a:t>Some text</a:t>
-            </a:r>
             <a:endParaRPr lang="en-US" dirty="0"/>
           </a:p>
         </p:txBody>
@@ -6446,10 +6417,18 @@
           <a:lstStyle/>
           <a:p>
             <a:r>
-              <a:rPr lang="en-US" smtClean="0"/>
+              <a:rPr lang="en-US" dirty="0" smtClean="0">
+                <a:solidFill>
+                  <a:srgbClr val="FF0000"/>
+                </a:solidFill>
+              </a:rPr>
               <a:t>gmaroko@ieee.org</a:t>
             </a:r>
-            <a:endParaRPr lang="en-US"/>
+            <a:endParaRPr lang="en-US" dirty="0">
+              <a:solidFill>
+                <a:srgbClr val="FF0000"/>
+              </a:solidFill>
+            </a:endParaRPr>
           </a:p>
         </p:txBody>
       </p:sp>
@@ -6476,6 +6455,80 @@
           </a:p>
         </p:txBody>
       </p:sp>
+      <p:graphicFrame>
+        <p:nvGraphicFramePr>
+          <p:cNvPr id="6" name="Table 5"/>
+          <p:cNvGraphicFramePr>
+            <a:graphicFrameLocks noGrp="1"/>
+          </p:cNvGraphicFramePr>
+          <p:nvPr>
+            <p:extLst>
+              <p:ext uri="{D42A27DB-BD31-4B8C-83A1-F6EECF244321}">
+                <p14:modId xmlns:p14="http://schemas.microsoft.com/office/powerpoint/2010/main" val="1099134916"/>
+              </p:ext>
+            </p:extLst>
+          </p:nvPr>
+        </p:nvGraphicFramePr>
+        <p:xfrm>
+          <a:off x="2128982" y="401781"/>
+          <a:ext cx="8128000" cy="365760"/>
+        </p:xfrm>
+        <a:graphic>
+          <a:graphicData uri="http://schemas.openxmlformats.org/drawingml/2006/table">
+            <a:tbl>
+              <a:tblPr firstRow="1" bandRow="1">
+                <a:tableStyleId>{F5AB1C69-6EDB-4FF4-983F-18BD219EF322}</a:tableStyleId>
+              </a:tblPr>
+              <a:tblGrid>
+                <a:gridCol w="8128000"/>
+              </a:tblGrid>
+              <a:tr h="318654">
+                <a:tc>
+                  <a:txBody>
+                    <a:bodyPr/>
+                    <a:lstStyle/>
+                    <a:p>
+                      <a:pPr algn="ctr"/>
+                      <a:r>
+                        <a:rPr lang="en-US" dirty="0" smtClean="0"/>
+                        <a:t>MF: Summary</a:t>
+                      </a:r>
+                      <a:endParaRPr lang="en-US" dirty="0"/>
+                    </a:p>
+                  </a:txBody>
+                  <a:tcPr>
+                    <a:lnL w="12700" cmpd="sng">
+                      <a:noFill/>
+                    </a:lnL>
+                    <a:lnR w="12700" cmpd="sng">
+                      <a:noFill/>
+                    </a:lnR>
+                    <a:lnT w="12700" cmpd="sng">
+                      <a:noFill/>
+                    </a:lnT>
+                    <a:lnB w="38100" cmpd="sng">
+                      <a:noFill/>
+                    </a:lnB>
+                    <a:lnTlToBr w="12700" cmpd="sng">
+                      <a:noFill/>
+                      <a:prstDash val="solid"/>
+                    </a:lnTlToBr>
+                    <a:lnBlToTr w="12700" cmpd="sng">
+                      <a:noFill/>
+                      <a:prstDash val="solid"/>
+                    </a:lnBlToTr>
+                    <a:solidFill>
+                      <a:schemeClr val="accent1">
+                        <a:lumMod val="50000"/>
+                      </a:schemeClr>
+                    </a:solidFill>
+                  </a:tcPr>
+                </a:tc>
+              </a:tr>
+            </a:tbl>
+          </a:graphicData>
+        </a:graphic>
+      </p:graphicFrame>
     </p:spTree>
     <p:extLst>
       <p:ext uri="{BB962C8B-B14F-4D97-AF65-F5344CB8AC3E}">
@@ -6508,7 +6561,7 @@
       </p:grpSpPr>
       <p:sp>
         <p:nvSpPr>
-          <p:cNvPr id="2" name="Title 1"/>
+          <p:cNvPr id="7" name="Title 1"/>
           <p:cNvSpPr>
             <a:spLocks noGrp="1"/>
           </p:cNvSpPr>
@@ -6518,143 +6571,7 @@
         </p:nvSpPr>
         <p:spPr>
           <a:xfrm>
-            <a:off x="0" y="1"/>
-            <a:ext cx="12192000" cy="720435"/>
-          </a:xfrm>
-        </p:spPr>
-        <p:txBody>
-          <a:bodyPr/>
-          <a:lstStyle/>
-          <a:p>
-            <a:pPr algn="ctr"/>
-            <a:r>
-              <a:rPr lang="en-US" dirty="0" smtClean="0"/>
-              <a:t>Target</a:t>
-            </a:r>
-            <a:endParaRPr lang="en-US" dirty="0"/>
-          </a:p>
-        </p:txBody>
-      </p:sp>
-      <p:sp>
-        <p:nvSpPr>
-          <p:cNvPr id="3" name="Content Placeholder 2"/>
-          <p:cNvSpPr>
-            <a:spLocks noGrp="1"/>
-          </p:cNvSpPr>
-          <p:nvPr>
-            <p:ph idx="1"/>
-          </p:nvPr>
-        </p:nvSpPr>
-        <p:spPr>
-          <a:xfrm>
-            <a:off x="0" y="720436"/>
-            <a:ext cx="12192000" cy="6137564"/>
-          </a:xfrm>
-        </p:spPr>
-        <p:txBody>
-          <a:bodyPr/>
-          <a:lstStyle/>
-          <a:p>
-            <a:pPr marL="0" indent="0">
-              <a:buNone/>
-            </a:pPr>
-            <a:r>
-              <a:rPr lang="en-US" dirty="0" smtClean="0"/>
-              <a:t>Some text</a:t>
-            </a:r>
-            <a:endParaRPr lang="en-US" dirty="0"/>
-          </a:p>
-        </p:txBody>
-      </p:sp>
-      <p:sp>
-        <p:nvSpPr>
-          <p:cNvPr id="4" name="Footer Placeholder 3"/>
-          <p:cNvSpPr>
-            <a:spLocks noGrp="1"/>
-          </p:cNvSpPr>
-          <p:nvPr>
-            <p:ph type="ftr" sz="quarter" idx="11"/>
-          </p:nvPr>
-        </p:nvSpPr>
-        <p:spPr/>
-        <p:txBody>
-          <a:bodyPr/>
-          <a:lstStyle/>
-          <a:p>
-            <a:r>
-              <a:rPr lang="en-US" smtClean="0"/>
-              <a:t>gmaroko@ieee.org</a:t>
-            </a:r>
-            <a:endParaRPr lang="en-US"/>
-          </a:p>
-        </p:txBody>
-      </p:sp>
-      <p:sp>
-        <p:nvSpPr>
-          <p:cNvPr id="5" name="Slide Number Placeholder 4"/>
-          <p:cNvSpPr>
-            <a:spLocks noGrp="1"/>
-          </p:cNvSpPr>
-          <p:nvPr>
-            <p:ph type="sldNum" sz="quarter" idx="12"/>
-          </p:nvPr>
-        </p:nvSpPr>
-        <p:spPr/>
-        <p:txBody>
-          <a:bodyPr/>
-          <a:lstStyle/>
-          <a:p>
-            <a:fld id="{9533B5C1-30EE-4828-977B-618A020EC41A}" type="slidenum">
-              <a:rPr lang="en-US" smtClean="0"/>
-              <a:t>3</a:t>
-            </a:fld>
-            <a:endParaRPr lang="en-US"/>
-          </a:p>
-        </p:txBody>
-      </p:sp>
-    </p:spTree>
-    <p:extLst>
-      <p:ext uri="{BB962C8B-B14F-4D97-AF65-F5344CB8AC3E}">
-        <p14:creationId xmlns:p14="http://schemas.microsoft.com/office/powerpoint/2010/main" val="3292717950"/>
-      </p:ext>
-    </p:extLst>
-  </p:cSld>
-  <p:clrMapOvr>
-    <a:masterClrMapping/>
-  </p:clrMapOvr>
-</p:sld>
-</file>
-
-<file path=ppt/slides/slide4.xml><?xml version="1.0" encoding="utf-8"?>
-<p:sld xmlns:a="http://schemas.openxmlformats.org/drawingml/2006/main" xmlns:r="http://schemas.openxmlformats.org/officeDocument/2006/relationships" xmlns:p="http://schemas.openxmlformats.org/presentationml/2006/main">
-  <p:cSld>
-    <p:spTree>
-      <p:nvGrpSpPr>
-        <p:cNvPr id="1" name=""/>
-        <p:cNvGrpSpPr/>
-        <p:nvPr/>
-      </p:nvGrpSpPr>
-      <p:grpSpPr>
-        <a:xfrm>
-          <a:off x="0" y="0"/>
-          <a:ext cx="0" cy="0"/>
-          <a:chOff x="0" y="0"/>
-          <a:chExt cx="0" cy="0"/>
-        </a:xfrm>
-      </p:grpSpPr>
-      <p:sp>
-        <p:nvSpPr>
-          <p:cNvPr id="7" name="Title 1"/>
-          <p:cNvSpPr>
-            <a:spLocks noGrp="1"/>
-          </p:cNvSpPr>
-          <p:nvPr>
-            <p:ph type="title"/>
-          </p:nvPr>
-        </p:nvSpPr>
-        <p:spPr>
-          <a:xfrm>
-            <a:off x="1805908" y="2146952"/>
+            <a:off x="1827973" y="2341347"/>
             <a:ext cx="8229600" cy="876630"/>
           </a:xfrm>
         </p:spPr>
@@ -6751,7 +6668,7 @@
         </p:blipFill>
         <p:spPr bwMode="auto">
           <a:xfrm>
-            <a:off x="5015800" y="552951"/>
+            <a:off x="5066627" y="629889"/>
             <a:ext cx="2005222" cy="1452374"/>
           </a:xfrm>
           <a:prstGeom prst="rect">
@@ -6785,7 +6702,7 @@
         </p:blipFill>
         <p:spPr>
           <a:xfrm>
-            <a:off x="8136371" y="3848974"/>
+            <a:off x="8226698" y="3942974"/>
             <a:ext cx="1970926" cy="1478194"/>
           </a:xfrm>
           <a:prstGeom prst="rect">
@@ -6816,7 +6733,7 @@
         </p:blipFill>
         <p:spPr bwMode="auto">
           <a:xfrm>
-            <a:off x="7254841" y="330018"/>
+            <a:off x="7649902" y="715713"/>
             <a:ext cx="2160006" cy="1542862"/>
           </a:xfrm>
           <a:prstGeom prst="rect">
@@ -6857,7 +6774,7 @@
         </p:blipFill>
         <p:spPr bwMode="auto">
           <a:xfrm>
-            <a:off x="8052078" y="2036692"/>
+            <a:off x="8091805" y="2341347"/>
             <a:ext cx="2145546" cy="1260020"/>
           </a:xfrm>
           <a:prstGeom prst="rect">
@@ -6905,7 +6822,7 @@
         </p:blipFill>
         <p:spPr bwMode="auto">
           <a:xfrm>
-            <a:off x="2079788" y="3716591"/>
+            <a:off x="1881535" y="3760713"/>
             <a:ext cx="1905000" cy="1905000"/>
           </a:xfrm>
           <a:prstGeom prst="rect">
@@ -6946,7 +6863,7 @@
         </p:blipFill>
         <p:spPr bwMode="auto">
           <a:xfrm>
-            <a:off x="1904903" y="2333387"/>
+            <a:off x="1963686" y="2415523"/>
             <a:ext cx="1990299" cy="1333500"/>
           </a:xfrm>
           <a:prstGeom prst="rect">
@@ -6987,7 +6904,7 @@
         </p:blipFill>
         <p:spPr bwMode="auto">
           <a:xfrm>
-            <a:off x="2677011" y="715815"/>
+            <a:off x="2615623" y="868262"/>
             <a:ext cx="1992031" cy="1463792"/>
           </a:xfrm>
           <a:prstGeom prst="rect">
@@ -7013,7 +6930,7 @@
         </p:nvSpPr>
         <p:spPr>
           <a:xfrm>
-            <a:off x="1986378" y="3439227"/>
+            <a:off x="2053527" y="3521339"/>
             <a:ext cx="1827347" cy="208640"/>
           </a:xfrm>
           <a:prstGeom prst="rect">
@@ -7060,11 +6977,6 @@
               </a:rPr>
               <a:t>Resilience</a:t>
             </a:r>
-            <a:endParaRPr lang="en-US" sz="1400" b="1" dirty="0">
-              <a:solidFill>
-                <a:srgbClr val="1F497D"/>
-              </a:solidFill>
-            </a:endParaRPr>
           </a:p>
         </p:txBody>
       </p:sp>
@@ -7076,7 +6988,7 @@
         </p:nvSpPr>
         <p:spPr>
           <a:xfrm>
-            <a:off x="2759352" y="1886773"/>
+            <a:off x="2751026" y="2053972"/>
             <a:ext cx="1827347" cy="208640"/>
           </a:xfrm>
           <a:prstGeom prst="rect">
@@ -7123,11 +7035,6 @@
               </a:rPr>
               <a:t>Openness</a:t>
             </a:r>
-            <a:endParaRPr lang="en-US" sz="1400" b="1" dirty="0">
-              <a:solidFill>
-                <a:srgbClr val="1F497D"/>
-              </a:solidFill>
-            </a:endParaRPr>
           </a:p>
         </p:txBody>
       </p:sp>
@@ -7139,7 +7046,7 @@
         </p:nvSpPr>
         <p:spPr>
           <a:xfrm>
-            <a:off x="5085501" y="1358022"/>
+            <a:off x="5155564" y="1829345"/>
             <a:ext cx="1827347" cy="208640"/>
           </a:xfrm>
           <a:prstGeom prst="rect">
@@ -7186,11 +7093,6 @@
               </a:rPr>
               <a:t>Privacy</a:t>
             </a:r>
-            <a:endParaRPr lang="en-US" sz="1400" b="1" dirty="0">
-              <a:solidFill>
-                <a:srgbClr val="1F497D"/>
-              </a:solidFill>
-            </a:endParaRPr>
           </a:p>
         </p:txBody>
       </p:sp>
@@ -7202,7 +7104,7 @@
         </p:nvSpPr>
         <p:spPr>
           <a:xfrm>
-            <a:off x="7499487" y="1621817"/>
+            <a:off x="7857220" y="1957835"/>
             <a:ext cx="1827347" cy="208640"/>
           </a:xfrm>
           <a:prstGeom prst="rect">
@@ -7249,11 +7151,6 @@
               </a:rPr>
               <a:t>Scalability</a:t>
             </a:r>
-            <a:endParaRPr lang="en-US" sz="1400" b="1" dirty="0">
-              <a:solidFill>
-                <a:srgbClr val="1F497D"/>
-              </a:solidFill>
-            </a:endParaRPr>
           </a:p>
         </p:txBody>
       </p:sp>
@@ -7265,7 +7162,7 @@
         </p:nvSpPr>
         <p:spPr>
           <a:xfrm>
-            <a:off x="8164533" y="3254289"/>
+            <a:off x="8298486" y="3379180"/>
             <a:ext cx="1827347" cy="208640"/>
           </a:xfrm>
           <a:prstGeom prst="rect">
@@ -7312,11 +7209,6 @@
               </a:rPr>
               <a:t>Data protection</a:t>
             </a:r>
-            <a:endParaRPr lang="en-US" sz="1400" b="1" dirty="0">
-              <a:solidFill>
-                <a:srgbClr val="1F497D"/>
-              </a:solidFill>
-            </a:endParaRPr>
           </a:p>
         </p:txBody>
       </p:sp>
@@ -7328,7 +7220,7 @@
         </p:nvSpPr>
         <p:spPr>
           <a:xfrm>
-            <a:off x="8208161" y="5142327"/>
+            <a:off x="8298487" y="5158985"/>
             <a:ext cx="1827347" cy="208640"/>
           </a:xfrm>
           <a:prstGeom prst="rect">
@@ -7375,11 +7267,6 @@
               </a:rPr>
               <a:t>Security</a:t>
             </a:r>
-            <a:endParaRPr lang="en-US" sz="1400" b="1" dirty="0">
-              <a:solidFill>
-                <a:srgbClr val="1F497D"/>
-              </a:solidFill>
-            </a:endParaRPr>
           </a:p>
         </p:txBody>
       </p:sp>
@@ -7438,11 +7325,6 @@
               </a:rPr>
               <a:t>Flexibility</a:t>
             </a:r>
-            <a:endParaRPr lang="en-US" sz="1400" b="1" dirty="0">
-              <a:solidFill>
-                <a:srgbClr val="1F497D"/>
-              </a:solidFill>
-            </a:endParaRPr>
           </a:p>
         </p:txBody>
       </p:sp>
@@ -7498,7 +7380,7 @@
         </p:blipFill>
         <p:spPr bwMode="auto">
           <a:xfrm>
-            <a:off x="6290957" y="5427303"/>
+            <a:off x="6121579" y="5367625"/>
             <a:ext cx="1920380" cy="1329826"/>
           </a:xfrm>
           <a:prstGeom prst="rect">
@@ -7565,11 +7447,6 @@
               </a:rPr>
               <a:t>Cultural and age adaptation</a:t>
             </a:r>
-            <a:endParaRPr lang="en-US" sz="1400" b="1" dirty="0">
-              <a:solidFill>
-                <a:srgbClr val="1F497D"/>
-              </a:solidFill>
-            </a:endParaRPr>
           </a:p>
         </p:txBody>
       </p:sp>
@@ -7581,7 +7458,7 @@
         </p:nvSpPr>
         <p:spPr>
           <a:xfrm>
-            <a:off x="6366364" y="6524049"/>
+            <a:off x="6200757" y="6408198"/>
             <a:ext cx="1827347" cy="208640"/>
           </a:xfrm>
           <a:prstGeom prst="rect">
@@ -7628,11 +7505,104 @@
               </a:rPr>
               <a:t>Reliability</a:t>
             </a:r>
-            <a:endParaRPr lang="en-US" sz="1400" b="1" dirty="0">
-              <a:solidFill>
-                <a:srgbClr val="1F497D"/>
-              </a:solidFill>
-            </a:endParaRPr>
+          </a:p>
+        </p:txBody>
+      </p:sp>
+      <p:graphicFrame>
+        <p:nvGraphicFramePr>
+          <p:cNvPr id="2" name="Table 1"/>
+          <p:cNvGraphicFramePr>
+            <a:graphicFrameLocks noGrp="1"/>
+          </p:cNvGraphicFramePr>
+          <p:nvPr>
+            <p:extLst>
+              <p:ext uri="{D42A27DB-BD31-4B8C-83A1-F6EECF244321}">
+                <p14:modId xmlns:p14="http://schemas.microsoft.com/office/powerpoint/2010/main" val="784995435"/>
+              </p:ext>
+            </p:extLst>
+          </p:nvPr>
+        </p:nvGraphicFramePr>
+        <p:xfrm>
+          <a:off x="1946172" y="189776"/>
+          <a:ext cx="8128000" cy="370840"/>
+        </p:xfrm>
+        <a:graphic>
+          <a:graphicData uri="http://schemas.openxmlformats.org/drawingml/2006/table">
+            <a:tbl>
+              <a:tblPr firstRow="1" bandRow="1">
+                <a:tableStyleId>{00A15C55-8517-42AA-B614-E9B94910E393}</a:tableStyleId>
+              </a:tblPr>
+              <a:tblGrid>
+                <a:gridCol w="8128000"/>
+              </a:tblGrid>
+              <a:tr h="370840">
+                <a:tc>
+                  <a:txBody>
+                    <a:bodyPr/>
+                    <a:lstStyle/>
+                    <a:p>
+                      <a:pPr algn="ctr"/>
+                      <a:r>
+                        <a:rPr lang="en-US" baseline="0" dirty="0" smtClean="0"/>
+                        <a:t>Long Term Targets</a:t>
+                      </a:r>
+                      <a:endParaRPr lang="en-US" dirty="0"/>
+                    </a:p>
+                  </a:txBody>
+                  <a:tcPr>
+                    <a:lnL w="12700" cmpd="sng">
+                      <a:noFill/>
+                    </a:lnL>
+                    <a:lnR w="12700" cmpd="sng">
+                      <a:noFill/>
+                    </a:lnR>
+                    <a:lnT w="12700" cmpd="sng">
+                      <a:noFill/>
+                    </a:lnT>
+                    <a:lnB w="38100" cmpd="sng">
+                      <a:noFill/>
+                    </a:lnB>
+                    <a:lnTlToBr w="12700" cmpd="sng">
+                      <a:noFill/>
+                      <a:prstDash val="solid"/>
+                    </a:lnTlToBr>
+                    <a:lnBlToTr w="12700" cmpd="sng">
+                      <a:noFill/>
+                      <a:prstDash val="solid"/>
+                    </a:lnBlToTr>
+                    <a:solidFill>
+                      <a:schemeClr val="accent1">
+                        <a:lumMod val="50000"/>
+                      </a:schemeClr>
+                    </a:solidFill>
+                  </a:tcPr>
+                </a:tc>
+              </a:tr>
+            </a:tbl>
+          </a:graphicData>
+        </a:graphic>
+      </p:graphicFrame>
+      <p:sp>
+        <p:nvSpPr>
+          <p:cNvPr id="3" name="Slide Number Placeholder 2"/>
+          <p:cNvSpPr>
+            <a:spLocks noGrp="1"/>
+          </p:cNvSpPr>
+          <p:nvPr>
+            <p:ph type="sldNum" sz="quarter" idx="10"/>
+          </p:nvPr>
+        </p:nvSpPr>
+        <p:spPr/>
+        <p:txBody>
+          <a:bodyPr/>
+          <a:lstStyle/>
+          <a:p>
+            <a:fld id="{C41A33F2-87F3-0845-BBF1-AC1C7FE79E05}" type="slidenum">
+              <a:rPr lang="en-US" smtClean="0"/>
+              <a:pPr/>
+              <a:t>3</a:t>
+            </a:fld>
+            <a:endParaRPr lang="en-US"/>
           </a:p>
         </p:txBody>
       </p:sp>

</xml_diff>

<commit_message>
Added MF: Summary - MF.pptx
</commit_message>
<xml_diff>
--- a/MF.pptx
+++ b/MF.pptx
@@ -6337,10 +6337,12 @@
           <a:p>
             <a:pPr algn="r"/>
             <a:r>
-              <a:rPr lang="en-US" dirty="0" smtClean="0"/>
+              <a:rPr lang="en-US" dirty="0" smtClean="0">
+                <a:hlinkClick r:id="rId2"/>
+              </a:rPr>
               <a:t>gmaroko@ieee.org</a:t>
             </a:r>
-            <a:endParaRPr lang="en-US" dirty="0"/>
+            <a:endParaRPr lang="en-US" dirty="0" smtClean="0"/>
           </a:p>
         </p:txBody>
       </p:sp>
@@ -6374,33 +6376,35 @@
           <a:chExt cx="0" cy="0"/>
         </a:xfrm>
       </p:grpSpPr>
-      <p:sp>
-        <p:nvSpPr>
-          <p:cNvPr id="3" name="Content Placeholder 2"/>
-          <p:cNvSpPr>
-            <a:spLocks noGrp="1"/>
-          </p:cNvSpPr>
+      <p:pic>
+        <p:nvPicPr>
+          <p:cNvPr id="7" name="Content Placeholder 6"/>
+          <p:cNvPicPr>
+            <a:picLocks noGrp="1" noChangeAspect="1"/>
+          </p:cNvPicPr>
           <p:nvPr>
             <p:ph idx="1"/>
           </p:nvPr>
-        </p:nvSpPr>
+        </p:nvPicPr>
+        <p:blipFill>
+          <a:blip r:embed="rId3">
+            <a:extLst>
+              <a:ext uri="{28A0092B-C50C-407E-A947-70E740481C1C}">
+                <a14:useLocalDpi xmlns:a14="http://schemas.microsoft.com/office/drawing/2010/main" val="0"/>
+              </a:ext>
+            </a:extLst>
+          </a:blip>
+          <a:stretch>
+            <a:fillRect/>
+          </a:stretch>
+        </p:blipFill>
         <p:spPr>
           <a:xfrm>
-            <a:off x="0" y="720436"/>
-            <a:ext cx="12192000" cy="6137564"/>
+            <a:off x="0" y="601151"/>
+            <a:ext cx="5320145" cy="3860945"/>
           </a:xfrm>
         </p:spPr>
-        <p:txBody>
-          <a:bodyPr/>
-          <a:lstStyle/>
-          <a:p>
-            <a:pPr marL="0" indent="0">
-              <a:buNone/>
-            </a:pPr>
-            <a:endParaRPr lang="en-US" dirty="0"/>
-          </a:p>
-        </p:txBody>
-      </p:sp>
+      </p:pic>
       <p:sp>
         <p:nvSpPr>
           <p:cNvPr id="4" name="Footer Placeholder 3"/>
@@ -6464,14 +6468,14 @@
           <p:nvPr>
             <p:extLst>
               <p:ext uri="{D42A27DB-BD31-4B8C-83A1-F6EECF244321}">
-                <p14:modId xmlns:p14="http://schemas.microsoft.com/office/powerpoint/2010/main" val="1099134916"/>
+                <p14:modId xmlns:p14="http://schemas.microsoft.com/office/powerpoint/2010/main" val="1021336358"/>
               </p:ext>
             </p:extLst>
           </p:nvPr>
         </p:nvGraphicFramePr>
         <p:xfrm>
-          <a:off x="2128982" y="401781"/>
-          <a:ext cx="8128000" cy="365760"/>
+          <a:off x="2119745" y="180109"/>
+          <a:ext cx="8123382" cy="365760"/>
         </p:xfrm>
         <a:graphic>
           <a:graphicData uri="http://schemas.openxmlformats.org/drawingml/2006/table">
@@ -6480,9 +6484,9 @@
                 <a:tableStyleId>{F5AB1C69-6EDB-4FF4-983F-18BD219EF322}</a:tableStyleId>
               </a:tblPr>
               <a:tblGrid>
-                <a:gridCol w="8128000"/>
+                <a:gridCol w="8123382"/>
               </a:tblGrid>
-              <a:tr h="318654">
+              <a:tr h="365759">
                 <a:tc>
                   <a:txBody>
                     <a:bodyPr/>
@@ -6529,6 +6533,66 @@
           </a:graphicData>
         </a:graphic>
       </p:graphicFrame>
+      <p:pic>
+        <p:nvPicPr>
+          <p:cNvPr id="8" name="Picture 7"/>
+          <p:cNvPicPr>
+            <a:picLocks noChangeAspect="1"/>
+          </p:cNvPicPr>
+          <p:nvPr/>
+        </p:nvPicPr>
+        <p:blipFill>
+          <a:blip r:embed="rId4">
+            <a:extLst>
+              <a:ext uri="{28A0092B-C50C-407E-A947-70E740481C1C}">
+                <a14:useLocalDpi xmlns:a14="http://schemas.microsoft.com/office/drawing/2010/main" val="0"/>
+              </a:ext>
+            </a:extLst>
+          </a:blip>
+          <a:stretch>
+            <a:fillRect/>
+          </a:stretch>
+        </p:blipFill>
+        <p:spPr>
+          <a:xfrm>
+            <a:off x="5180652" y="773976"/>
+            <a:ext cx="6333421" cy="1110241"/>
+          </a:xfrm>
+          <a:prstGeom prst="rect">
+            <a:avLst/>
+          </a:prstGeom>
+        </p:spPr>
+      </p:pic>
+      <p:pic>
+        <p:nvPicPr>
+          <p:cNvPr id="9" name="Picture 8"/>
+          <p:cNvPicPr>
+            <a:picLocks noChangeAspect="1"/>
+          </p:cNvPicPr>
+          <p:nvPr/>
+        </p:nvPicPr>
+        <p:blipFill>
+          <a:blip r:embed="rId5">
+            <a:extLst>
+              <a:ext uri="{28A0092B-C50C-407E-A947-70E740481C1C}">
+                <a14:useLocalDpi xmlns:a14="http://schemas.microsoft.com/office/drawing/2010/main" val="0"/>
+              </a:ext>
+            </a:extLst>
+          </a:blip>
+          <a:stretch>
+            <a:fillRect/>
+          </a:stretch>
+        </p:blipFill>
+        <p:spPr>
+          <a:xfrm>
+            <a:off x="5430035" y="2057042"/>
+            <a:ext cx="6637275" cy="2948747"/>
+          </a:xfrm>
+          <a:prstGeom prst="rect">
+            <a:avLst/>
+          </a:prstGeom>
+        </p:spPr>
+      </p:pic>
     </p:spTree>
     <p:extLst>
       <p:ext uri="{BB962C8B-B14F-4D97-AF65-F5344CB8AC3E}">

</xml_diff>